<commit_message>
modified:   public/assets/.DS_Store 	modified:   public/assets/logo/logo-rectangle.png 	modified:   public/assets/logo/logo.pptx 	modified:   public/dashboard.html 	modified:   public/index.html 	modified:   public/login.html 	renamed:    public/privacy-policy.html -> public/privacy.html
</commit_message>
<xml_diff>
--- a/public/assets/logo/logo.pptx
+++ b/public/assets/logo/logo.pptx
@@ -3590,16 +3590,15 @@
           </p:cNvPicPr>
           <p:nvPr/>
         </p:nvPicPr>
-        <p:blipFill>
+        <p:blipFill rotWithShape="1">
           <a:blip r:embed="rId5"/>
-          <a:stretch>
-            <a:fillRect/>
-          </a:stretch>
+          <a:srcRect t="-3850" b="-25336"/>
+          <a:stretch/>
         </p:blipFill>
         <p:spPr>
           <a:xfrm>
-            <a:off x="6741576" y="1111114"/>
-            <a:ext cx="3194581" cy="2121592"/>
+            <a:off x="6741576" y="1029419"/>
+            <a:ext cx="3194581" cy="2740836"/>
           </a:xfrm>
           <a:prstGeom prst="rect">
             <a:avLst/>

</xml_diff>

<commit_message>
modified:   public/assets/logo/logo.pptx 	deleted:    public/assets/logo/~$logo.pptx 	modified:   public/dashboard.html 	modified:   public/index.html 	modified:   public/login.html 	modified:   public/rewards.html
</commit_message>
<xml_diff>
--- a/public/assets/logo/logo.pptx
+++ b/public/assets/logo/logo.pptx
@@ -3592,13 +3592,13 @@
         </p:nvPicPr>
         <p:blipFill rotWithShape="1">
           <a:blip r:embed="rId5"/>
-          <a:srcRect t="-3850" b="-25336"/>
+          <a:srcRect l="-14835" t="-63356" r="-2812" b="-84666"/>
           <a:stretch/>
         </p:blipFill>
         <p:spPr>
           <a:xfrm>
-            <a:off x="6741576" y="1029419"/>
-            <a:ext cx="3194581" cy="2740836"/>
+            <a:off x="4114025" y="868393"/>
+            <a:ext cx="3758331" cy="5262114"/>
           </a:xfrm>
           <a:prstGeom prst="rect">
             <a:avLst/>

</xml_diff>